<commit_message>
update thiet ke chi tiet
</commit_message>
<xml_diff>
--- a/BaoCao/2.Thiết kế hệ thống/GiaoDien.pptx
+++ b/BaoCao/2.Thiết kế hệ thống/GiaoDien.pptx
@@ -111,6 +111,11 @@
       </a:defRPr>
     </a:lvl9pPr>
   </p:defaultTextStyle>
+  <p:extLst>
+    <p:ext uri="{EFAFB233-063F-42B5-8137-9DF3F51BA10A}">
+      <p15:sldGuideLst xmlns:p15="http://schemas.microsoft.com/office/powerpoint/2012/main"/>
+    </p:ext>
+  </p:extLst>
 </p:presentation>
 </file>
 
@@ -261,7 +266,7 @@
           <a:p>
             <a:fld id="{67A7A6C0-62BD-48B3-A38A-BFC3C65E18C6}" type="datetimeFigureOut">
               <a:rPr lang="en-US" smtClean="0"/>
-              <a:t>10/10/2023</a:t>
+              <a:t>10/11/2023</a:t>
             </a:fld>
             <a:endParaRPr lang="en-US"/>
           </a:p>
@@ -459,7 +464,7 @@
           <a:p>
             <a:fld id="{67A7A6C0-62BD-48B3-A38A-BFC3C65E18C6}" type="datetimeFigureOut">
               <a:rPr lang="en-US" smtClean="0"/>
-              <a:t>10/10/2023</a:t>
+              <a:t>10/11/2023</a:t>
             </a:fld>
             <a:endParaRPr lang="en-US"/>
           </a:p>
@@ -667,7 +672,7 @@
           <a:p>
             <a:fld id="{67A7A6C0-62BD-48B3-A38A-BFC3C65E18C6}" type="datetimeFigureOut">
               <a:rPr lang="en-US" smtClean="0"/>
-              <a:t>10/10/2023</a:t>
+              <a:t>10/11/2023</a:t>
             </a:fld>
             <a:endParaRPr lang="en-US"/>
           </a:p>
@@ -865,7 +870,7 @@
           <a:p>
             <a:fld id="{67A7A6C0-62BD-48B3-A38A-BFC3C65E18C6}" type="datetimeFigureOut">
               <a:rPr lang="en-US" smtClean="0"/>
-              <a:t>10/10/2023</a:t>
+              <a:t>10/11/2023</a:t>
             </a:fld>
             <a:endParaRPr lang="en-US"/>
           </a:p>
@@ -1140,7 +1145,7 @@
           <a:p>
             <a:fld id="{67A7A6C0-62BD-48B3-A38A-BFC3C65E18C6}" type="datetimeFigureOut">
               <a:rPr lang="en-US" smtClean="0"/>
-              <a:t>10/10/2023</a:t>
+              <a:t>10/11/2023</a:t>
             </a:fld>
             <a:endParaRPr lang="en-US"/>
           </a:p>
@@ -1405,7 +1410,7 @@
           <a:p>
             <a:fld id="{67A7A6C0-62BD-48B3-A38A-BFC3C65E18C6}" type="datetimeFigureOut">
               <a:rPr lang="en-US" smtClean="0"/>
-              <a:t>10/10/2023</a:t>
+              <a:t>10/11/2023</a:t>
             </a:fld>
             <a:endParaRPr lang="en-US"/>
           </a:p>
@@ -1817,7 +1822,7 @@
           <a:p>
             <a:fld id="{67A7A6C0-62BD-48B3-A38A-BFC3C65E18C6}" type="datetimeFigureOut">
               <a:rPr lang="en-US" smtClean="0"/>
-              <a:t>10/10/2023</a:t>
+              <a:t>10/11/2023</a:t>
             </a:fld>
             <a:endParaRPr lang="en-US"/>
           </a:p>
@@ -1958,7 +1963,7 @@
           <a:p>
             <a:fld id="{67A7A6C0-62BD-48B3-A38A-BFC3C65E18C6}" type="datetimeFigureOut">
               <a:rPr lang="en-US" smtClean="0"/>
-              <a:t>10/10/2023</a:t>
+              <a:t>10/11/2023</a:t>
             </a:fld>
             <a:endParaRPr lang="en-US"/>
           </a:p>
@@ -2071,7 +2076,7 @@
           <a:p>
             <a:fld id="{67A7A6C0-62BD-48B3-A38A-BFC3C65E18C6}" type="datetimeFigureOut">
               <a:rPr lang="en-US" smtClean="0"/>
-              <a:t>10/10/2023</a:t>
+              <a:t>10/11/2023</a:t>
             </a:fld>
             <a:endParaRPr lang="en-US"/>
           </a:p>
@@ -2382,7 +2387,7 @@
           <a:p>
             <a:fld id="{67A7A6C0-62BD-48B3-A38A-BFC3C65E18C6}" type="datetimeFigureOut">
               <a:rPr lang="en-US" smtClean="0"/>
-              <a:t>10/10/2023</a:t>
+              <a:t>10/11/2023</a:t>
             </a:fld>
             <a:endParaRPr lang="en-US"/>
           </a:p>
@@ -2670,7 +2675,7 @@
           <a:p>
             <a:fld id="{67A7A6C0-62BD-48B3-A38A-BFC3C65E18C6}" type="datetimeFigureOut">
               <a:rPr lang="en-US" smtClean="0"/>
-              <a:t>10/10/2023</a:t>
+              <a:t>10/11/2023</a:t>
             </a:fld>
             <a:endParaRPr lang="en-US"/>
           </a:p>
@@ -2911,7 +2916,7 @@
           <a:p>
             <a:fld id="{67A7A6C0-62BD-48B3-A38A-BFC3C65E18C6}" type="datetimeFigureOut">
               <a:rPr lang="en-US" smtClean="0"/>
-              <a:t>10/10/2023</a:t>
+              <a:t>10/11/2023</a:t>
             </a:fld>
             <a:endParaRPr lang="en-US"/>
           </a:p>
@@ -3342,7 +3347,7 @@
         </p:nvGrpSpPr>
         <p:grpSpPr>
           <a:xfrm>
-            <a:off x="2236329" y="-1018721"/>
+            <a:off x="1810660" y="244702"/>
             <a:ext cx="7321192" cy="6368596"/>
             <a:chOff x="2236329" y="-1018721"/>
             <a:chExt cx="7321192" cy="6368596"/>

</xml_diff>